<commit_message>
- week 10 lecture 2 and 3.
</commit_message>
<xml_diff>
--- a/lectures/week10/lecture2/slides/week10_lecture2.pptx
+++ b/lectures/week10/lecture2/slides/week10_lecture2.pptx
@@ -40,7 +40,7 @@
     <p:sldId id="356" r:id="rId34"/>
     <p:sldId id="359" r:id="rId35"/>
     <p:sldId id="358" r:id="rId36"/>
-    <p:sldId id="325" r:id="rId37"/>
+    <p:sldId id="360" r:id="rId37"/>
   </p:sldIdLst>
   <p:sldSz cx="12192000" cy="6858000"/>
   <p:notesSz cx="6858000" cy="9144000"/>
@@ -179,7 +179,7 @@
             <p14:sldId id="356"/>
             <p14:sldId id="359"/>
             <p14:sldId id="358"/>
-            <p14:sldId id="325"/>
+            <p14:sldId id="360"/>
           </p14:sldIdLst>
         </p14:section>
       </p14:sectionLst>
@@ -13571,44 +13571,6 @@
               <a:t>.</a:t>
             </a:r>
           </a:p>
-          <a:p>
-            <a:pPr lvl="1"/>
-            <a:r>
-              <a:rPr lang="en-US" sz="2800" dirty="0"/>
-              <a:t>Be able to calculate distance between the Point and the origin</a:t>
-            </a:r>
-            <a:r>
-              <a:rPr lang="en-US" sz="2800" dirty="0">
-                <a:solidFill>
-                  <a:schemeClr val="accent2"/>
-                </a:solidFill>
-              </a:rPr>
-              <a:t>.</a:t>
-            </a:r>
-          </a:p>
-          <a:p>
-            <a:pPr lvl="1"/>
-            <a:r>
-              <a:rPr lang="en-US" sz="2800" dirty="0"/>
-              <a:t>Be able to calculate the midpoint between the Point instance and another point</a:t>
-            </a:r>
-            <a:r>
-              <a:rPr lang="en-US" sz="2800" dirty="0">
-                <a:solidFill>
-                  <a:schemeClr val="accent2"/>
-                </a:solidFill>
-              </a:rPr>
-              <a:t>.</a:t>
-            </a:r>
-          </a:p>
-          <a:p>
-            <a:pPr lvl="1"/>
-            <a:endParaRPr lang="en-US" sz="2800" dirty="0">
-              <a:solidFill>
-                <a:schemeClr val="accent2"/>
-              </a:solidFill>
-            </a:endParaRPr>
-          </a:p>
         </p:txBody>
       </p:sp>
       <p:sp>
@@ -13797,28 +13759,6 @@
               <a:t>distance between points</a:t>
             </a:r>
           </a:p>
-          <a:p>
-            <a:pPr algn="ctr"/>
-            <a:r>
-              <a:rPr lang="en-US" b="1" dirty="0">
-                <a:solidFill>
-                  <a:srgbClr val="FFFFFF"/>
-                </a:solidFill>
-              </a:rPr>
-              <a:t>distance from the origin</a:t>
-            </a:r>
-          </a:p>
-          <a:p>
-            <a:pPr algn="ctr"/>
-            <a:r>
-              <a:rPr lang="en-US" b="1" dirty="0">
-                <a:solidFill>
-                  <a:srgbClr val="FFFFFF"/>
-                </a:solidFill>
-              </a:rPr>
-              <a:t>midpoint between points</a:t>
-            </a:r>
-          </a:p>
         </p:txBody>
       </p:sp>
     </p:spTree>
@@ -14227,36 +14167,6 @@
             </a:r>
           </a:p>
           <a:p>
-            <a:pPr lvl="1"/>
-            <a:r>
-              <a:rPr lang="en-US" sz="2800" dirty="0"/>
-              <a:t>Be able to calculate distance between the Point and the origin</a:t>
-            </a:r>
-            <a:r>
-              <a:rPr lang="en-US" sz="2800" dirty="0">
-                <a:solidFill>
-                  <a:schemeClr val="accent2"/>
-                </a:solidFill>
-              </a:rPr>
-              <a:t>.</a:t>
-            </a:r>
-          </a:p>
-          <a:p>
-            <a:pPr lvl="1"/>
-            <a:r>
-              <a:rPr lang="en-US" sz="2800" dirty="0"/>
-              <a:t>Be able to calculate the midpoint between the Point instance and another point</a:t>
-            </a:r>
-            <a:r>
-              <a:rPr lang="en-US" sz="2800" dirty="0">
-                <a:solidFill>
-                  <a:schemeClr val="accent2"/>
-                </a:solidFill>
-              </a:rPr>
-              <a:t>.</a:t>
-            </a:r>
-          </a:p>
-          <a:p>
             <a:r>
               <a:rPr lang="en-US" sz="3200" dirty="0"/>
               <a:t>Let</a:t>
@@ -14279,7 +14189,7 @@
                   <a:schemeClr val="accent6"/>
                 </a:solidFill>
               </a:rPr>
-              <a:t>methods</a:t>
+              <a:t>method</a:t>
             </a:r>
             <a:r>
               <a:rPr lang="en-US" sz="3200" dirty="0">
@@ -14507,7 +14417,31 @@
             </a:r>
             <a:r>
               <a:rPr lang="en-US" dirty="0"/>
-              <a:t> related data and functions together in an object</a:t>
+              <a:t> related </a:t>
+            </a:r>
+            <a:r>
+              <a:rPr lang="en-US" dirty="0">
+                <a:solidFill>
+                  <a:schemeClr val="accent6"/>
+                </a:solidFill>
+              </a:rPr>
+              <a:t>data</a:t>
+            </a:r>
+            <a:r>
+              <a:rPr lang="en-US" dirty="0"/>
+              <a:t> and </a:t>
+            </a:r>
+            <a:r>
+              <a:rPr lang="en-US" dirty="0">
+                <a:solidFill>
+                  <a:schemeClr val="accent6"/>
+                </a:solidFill>
+              </a:rPr>
+              <a:t>functions</a:t>
+            </a:r>
+            <a:r>
+              <a:rPr lang="en-US" dirty="0"/>
+              <a:t> together in an object</a:t>
             </a:r>
             <a:r>
               <a:rPr lang="en-US" dirty="0">
@@ -15175,6 +15109,53 @@
           </a:p>
         </p:txBody>
       </p:sp>
+      <p:pic>
+        <p:nvPicPr>
+          <p:cNvPr id="1026" name="Picture 2" descr="RBC Mobile App - RBC Royal Bank">
+            <a:extLst>
+              <a:ext uri="{FF2B5EF4-FFF2-40B4-BE49-F238E27FC236}">
+                <a16:creationId xmlns:a16="http://schemas.microsoft.com/office/drawing/2014/main" id="{F43C3A75-EA07-4F83-979A-0837F12F9532}"/>
+              </a:ext>
+            </a:extLst>
+          </p:cNvPr>
+          <p:cNvPicPr>
+            <a:picLocks noChangeAspect="1" noChangeArrowheads="1"/>
+          </p:cNvPicPr>
+          <p:nvPr/>
+        </p:nvPicPr>
+        <p:blipFill>
+          <a:blip r:embed="rId2">
+            <a:extLst>
+              <a:ext uri="{28A0092B-C50C-407E-A947-70E740481C1C}">
+                <a14:useLocalDpi xmlns:a14="http://schemas.microsoft.com/office/drawing/2010/main" val="0"/>
+              </a:ext>
+            </a:extLst>
+          </a:blip>
+          <a:srcRect/>
+          <a:stretch>
+            <a:fillRect/>
+          </a:stretch>
+        </p:blipFill>
+        <p:spPr bwMode="auto">
+          <a:xfrm>
+            <a:off x="5143335" y="2890107"/>
+            <a:ext cx="1642477" cy="3315655"/>
+          </a:xfrm>
+          <a:prstGeom prst="rect">
+            <a:avLst/>
+          </a:prstGeom>
+          <a:noFill/>
+          <a:extLst>
+            <a:ext uri="{909E8E84-426E-40DD-AFC4-6F175D3DCCD1}">
+              <a14:hiddenFill xmlns:a14="http://schemas.microsoft.com/office/drawing/2010/main">
+                <a:solidFill>
+                  <a:srgbClr val="FFFFFF"/>
+                </a:solidFill>
+              </a14:hiddenFill>
+            </a:ext>
+          </a:extLst>
+        </p:spPr>
+      </p:pic>
     </p:spTree>
     <p:extLst>
       <p:ext uri="{BB962C8B-B14F-4D97-AF65-F5344CB8AC3E}">
@@ -15417,19 +15398,43 @@
           <a:p>
             <a:r>
               <a:rPr lang="en-US" dirty="0"/>
-              <a:t>tuples</a:t>
+              <a:t>objects</a:t>
             </a:r>
             <a:r>
               <a:rPr lang="en-US" dirty="0">
                 <a:solidFill>
+                  <a:schemeClr val="accent1"/>
+                </a:solidFill>
+              </a:rPr>
+              <a:t>,</a:t>
+            </a:r>
+            <a:r>
+              <a:rPr lang="en-US" dirty="0"/>
+              <a:t> classes</a:t>
+            </a:r>
+            <a:r>
+              <a:rPr lang="en-US" dirty="0">
+                <a:solidFill>
+                  <a:schemeClr val="accent1"/>
+                </a:solidFill>
+              </a:rPr>
+              <a:t>,</a:t>
+            </a:r>
+            <a:r>
+              <a:rPr lang="en-US" dirty="0"/>
+              <a:t> </a:t>
+            </a:r>
+            <a:r>
+              <a:rPr lang="en-US" dirty="0">
+                <a:solidFill>
                   <a:schemeClr val="accent6"/>
                 </a:solidFill>
               </a:rPr>
-              <a:t> and </a:t>
+              <a:t>and</a:t>
             </a:r>
             <a:r>
               <a:rPr lang="en-US" dirty="0"/>
-              <a:t>sets</a:t>
+              <a:t> methods</a:t>
             </a:r>
             <a:r>
               <a:rPr lang="en-US" dirty="0">
@@ -15473,7 +15478,7 @@
                   <a:schemeClr val="accent6"/>
                 </a:solidFill>
               </a:rPr>
-              <a:t>8</a:t>
+              <a:t>10</a:t>
             </a:r>
             <a:r>
               <a:rPr lang="en-US" b="1" dirty="0"/>
@@ -15497,7 +15502,7 @@
                   <a:schemeClr val="accent6"/>
                 </a:solidFill>
               </a:rPr>
-              <a:t>1 </a:t>
+              <a:t>2 </a:t>
             </a:r>
             <a:r>
               <a:rPr lang="en-US" dirty="0">
@@ -15513,7 +15518,7 @@
                   <a:schemeClr val="accent6"/>
                 </a:solidFill>
               </a:rPr>
-              <a:t>8</a:t>
+              <a:t>10</a:t>
             </a:r>
             <a:r>
               <a:rPr lang="en-US" dirty="0"/>
@@ -15525,7 +15530,7 @@
                   <a:schemeClr val="accent6"/>
                 </a:solidFill>
               </a:rPr>
-              <a:t>1</a:t>
+              <a:t>2</a:t>
             </a:r>
             <a:r>
               <a:rPr lang="en-US" dirty="0">
@@ -15541,7 +15546,7 @@
     </p:spTree>
     <p:extLst>
       <p:ext uri="{BB962C8B-B14F-4D97-AF65-F5344CB8AC3E}">
-        <p14:creationId xmlns:p14="http://schemas.microsoft.com/office/powerpoint/2010/main" val="2820120620"/>
+        <p14:creationId xmlns:p14="http://schemas.microsoft.com/office/powerpoint/2010/main" val="2329329627"/>
       </p:ext>
     </p:extLst>
   </p:cSld>

</xml_diff>